<commit_message>
Harmful Ingredients and Added Sugars, by Fouad Yared
</commit_message>
<xml_diff>
--- a/Project2-WebScraping/Harmful ingredients and added sugars, Fouad Yared.pptx
+++ b/Project2-WebScraping/Harmful ingredients and added sugars, Fouad Yared.pptx
@@ -511,6 +511,50 @@
 </file>
 
 <file path=ppt/notesSlides/notesSlide2.xml><?xml version="1.0" encoding="utf-8"?>
+<p:notes xmlns:a="http://schemas.openxmlformats.org/drawingml/2006/main" xmlns:r="http://schemas.openxmlformats.org/officeDocument/2006/relationships" xmlns:p="http://schemas.openxmlformats.org/presentationml/2006/main">
+  <p:cSld>
+    <p:spTree>
+      <p:nvGrpSpPr>
+        <p:cNvPr id="1" name=""/>
+        <p:cNvGrpSpPr/>
+        <p:nvPr/>
+      </p:nvGrpSpPr>
+      <p:grpSpPr/>
+      <p:sp>
+        <p:nvSpPr>
+          <p:cNvPr id="2" name="Slide Image Placeholder 1"/>
+          <p:cNvSpPr/>
+          <p:nvPr>
+            <p:ph type="sldImg" idx="2"/>
+          </p:nvPr>
+        </p:nvSpPr>
+        <p:spPr/>
+      </p:sp>
+      <p:sp>
+        <p:nvSpPr>
+          <p:cNvPr id="3" name="Text Placeholder 2"/>
+          <p:cNvSpPr/>
+          <p:nvPr>
+            <p:ph type="body" idx="3"/>
+          </p:nvPr>
+        </p:nvSpPr>
+        <p:spPr/>
+        <p:txBody>
+          <a:bodyPr/>
+          <a:p>
+            <a:endParaRPr lang="en-US"/>
+          </a:p>
+        </p:txBody>
+      </p:sp>
+    </p:spTree>
+  </p:cSld>
+  <p:clrMapOvr>
+    <a:masterClrMapping/>
+  </p:clrMapOvr>
+</p:notes>
+</file>
+
+<file path=ppt/notesSlides/notesSlide3.xml><?xml version="1.0" encoding="utf-8"?>
 <p:notes xmlns:a="http://schemas.openxmlformats.org/drawingml/2006/main" xmlns:r="http://schemas.openxmlformats.org/officeDocument/2006/relationships" xmlns:p="http://schemas.openxmlformats.org/presentationml/2006/main">
   <p:cSld>
     <p:spTree>
@@ -4330,7 +4374,7 @@
             </a:r>
             <a:r>
               <a:rPr lang="en-US" sz="1370">
-                <a:hlinkClick r:id="rId1" tooltip="" action="ppaction://hlinkfile"/>
+                <a:hlinkClick r:id="rId1" action="ppaction://hlinkfile"/>
               </a:rPr>
               <a:t>Environmental Working Group (EWG)</a:t>
             </a:r>
@@ -4901,7 +4945,7 @@
             </a:r>
             <a:r>
               <a:rPr lang="en-US">
-                <a:hlinkClick r:id="rId2" tooltip="" action="ppaction://hlinkfile"/>
+                <a:hlinkClick r:id="rId2" action="ppaction://hlinkfile"/>
               </a:rPr>
               <a:t>Washington Post</a:t>
             </a:r>
@@ -5796,13 +5840,7 @@
               <a:rPr lang="en-US" sz="1600">
                 <a:sym typeface="+mn-ea"/>
               </a:rPr>
-              <a:t>highest number of </a:t>
-            </a:r>
-            <a:r>
-              <a:rPr lang="en-US" sz="1600">
-                <a:sym typeface="+mn-ea"/>
-              </a:rPr>
-              <a:t>added sugars and </a:t>
+              <a:t>highest number of added sugars and </a:t>
             </a:r>
             <a:endParaRPr lang="en-US" sz="1600">
               <a:sym typeface="+mn-ea"/>
@@ -5881,6 +5919,33 @@
         <p:nvPr/>
       </p:nvGrpSpPr>
       <p:grpSpPr/>
+      <p:pic>
+        <p:nvPicPr>
+          <p:cNvPr id="6" name="Content Placeholder 5"/>
+          <p:cNvPicPr>
+            <a:picLocks noChangeAspect="1"/>
+          </p:cNvPicPr>
+          <p:nvPr>
+            <p:ph idx="1"/>
+          </p:nvPr>
+        </p:nvPicPr>
+        <p:blipFill>
+          <a:blip r:embed="rId1"/>
+          <a:srcRect l="16644" t="26462" r="10985" b="10090"/>
+          <a:stretch>
+            <a:fillRect/>
+          </a:stretch>
+        </p:blipFill>
+        <p:spPr>
+          <a:xfrm>
+            <a:off x="334010" y="1005205"/>
+            <a:ext cx="11523980" cy="5680710"/>
+          </a:xfrm>
+          <a:prstGeom prst="rect">
+            <a:avLst/>
+          </a:prstGeom>
+        </p:spPr>
+      </p:pic>
       <p:sp>
         <p:nvSpPr>
           <p:cNvPr id="2" name="Title 1"/>
@@ -5908,37 +5973,6 @@
           </a:p>
         </p:txBody>
       </p:sp>
-      <p:pic>
-        <p:nvPicPr>
-          <p:cNvPr id="5" name="Content Placeholder 4"/>
-          <p:cNvPicPr>
-            <a:picLocks noChangeAspect="1"/>
-          </p:cNvPicPr>
-          <p:nvPr>
-            <p:ph idx="1"/>
-          </p:nvPr>
-        </p:nvPicPr>
-        <p:blipFill>
-          <a:blip r:embed="rId1"/>
-          <a:srcRect l="15991" t="26456" r="12906" b="9412"/>
-          <a:stretch>
-            <a:fillRect/>
-          </a:stretch>
-        </p:blipFill>
-        <p:spPr>
-          <a:xfrm>
-            <a:off x="81915" y="1038860"/>
-            <a:ext cx="11500485" cy="5833110"/>
-          </a:xfrm>
-          <a:prstGeom prst="rect">
-            <a:avLst/>
-          </a:prstGeom>
-          <a:noFill/>
-          <a:ln w="9525">
-            <a:noFill/>
-          </a:ln>
-        </p:spPr>
-      </p:pic>
       <p:sp>
         <p:nvSpPr>
           <p:cNvPr id="4" name="Text Box 3"/>
@@ -5947,8 +5981,8 @@
         </p:nvSpPr>
         <p:spPr>
           <a:xfrm>
-            <a:off x="81915" y="1299210"/>
-            <a:ext cx="3322955" cy="822960"/>
+            <a:off x="3737610" y="1407160"/>
+            <a:ext cx="2522220" cy="1066800"/>
           </a:xfrm>
           <a:prstGeom prst="rect">
             <a:avLst/>
@@ -5963,7 +5997,7 @@
             <a:pPr algn="l"/>
             <a:r>
               <a:rPr lang="en-US" sz="1600"/>
-              <a:t>The scores of minimally or moderately processed foods </a:t>
+              <a:t>The scores of minimally </a:t>
             </a:r>
             <a:endParaRPr lang="en-US" sz="1600"/>
           </a:p>
@@ -5971,7 +6005,23 @@
             <a:pPr algn="l"/>
             <a:r>
               <a:rPr lang="en-US" sz="1600"/>
-              <a:t>follow a normal distribution.</a:t>
+              <a:t>or moderately processed </a:t>
+            </a:r>
+            <a:endParaRPr lang="en-US" sz="1600"/>
+          </a:p>
+          <a:p>
+            <a:pPr algn="l"/>
+            <a:r>
+              <a:rPr lang="en-US" sz="1600"/>
+              <a:t>foods follow a normal </a:t>
+            </a:r>
+            <a:endParaRPr lang="en-US" sz="1600"/>
+          </a:p>
+          <a:p>
+            <a:pPr algn="l"/>
+            <a:r>
+              <a:rPr lang="en-US" sz="1600"/>
+              <a:t>distribution.</a:t>
             </a:r>
             <a:endParaRPr lang="en-US" sz="1600"/>
           </a:p>
@@ -5985,8 +6035,8 @@
         </p:nvSpPr>
         <p:spPr>
           <a:xfrm>
-            <a:off x="7272655" y="1391920"/>
-            <a:ext cx="3573145" cy="822960"/>
+            <a:off x="7964170" y="1407160"/>
+            <a:ext cx="2954020" cy="822960"/>
           </a:xfrm>
           <a:prstGeom prst="rect">
             <a:avLst/>

</xml_diff>